<commit_message>
Weekly Report August 26th
</commit_message>
<xml_diff>
--- a/Project/Drawings.pptx
+++ b/Project/Drawings.pptx
@@ -5994,7 +5994,7 @@
             <a:avLst/>
           </a:prstGeom>
           <a:noFill/>
-          <a:ln w="38100" cmpd="sng">
+          <a:ln w="76200" cmpd="sng">
             <a:solidFill>
               <a:srgbClr val="008000"/>
             </a:solidFill>
@@ -6492,7 +6492,7 @@
             <a:avLst/>
           </a:prstGeom>
           <a:noFill/>
-          <a:ln w="38100" cmpd="sng">
+          <a:ln w="76200" cmpd="sng">
             <a:solidFill>
               <a:srgbClr val="1F497D"/>
             </a:solidFill>

</xml_diff>